<commit_message>
Actualizando Seccion 5 Diapos
</commit_message>
<xml_diff>
--- a/Seccion 5 Componentes Principales/Diapositivas/5.5 Interpretación y selección de los componentes.pptx
+++ b/Seccion 5 Componentes Principales/Diapositivas/5.5 Interpretación y selección de los componentes.pptx
@@ -267,7 +267,7 @@
             <a:fld id="{B61BEF0D-F0BB-DE4B-95CE-6DB70DBA9567}" type="datetimeFigureOut">
               <a:rPr lang="en-US" smtClean="0"/>
               <a:pPr/>
-              <a:t>1/24/2020</a:t>
+              <a:t>4/5/2020</a:t>
             </a:fld>
             <a:endParaRPr lang="en-US" dirty="0"/>
           </a:p>
@@ -466,7 +466,7 @@
           <a:p>
             <a:fld id="{55C6B4A9-1611-4792-9094-5F34BCA07E0B}" type="datetimeFigureOut">
               <a:rPr lang="en-US" smtClean="0"/>
-              <a:t>1/24/2020</a:t>
+              <a:t>4/5/2020</a:t>
             </a:fld>
             <a:endParaRPr lang="en-US" dirty="0"/>
           </a:p>
@@ -675,7 +675,7 @@
             <a:fld id="{B61BEF0D-F0BB-DE4B-95CE-6DB70DBA9567}" type="datetimeFigureOut">
               <a:rPr lang="en-US" smtClean="0"/>
               <a:pPr/>
-              <a:t>1/24/2020</a:t>
+              <a:t>4/5/2020</a:t>
             </a:fld>
             <a:endParaRPr lang="en-US" dirty="0"/>
           </a:p>
@@ -1495,7 +1495,7 @@
             <a:fld id="{B61BEF0D-F0BB-DE4B-95CE-6DB70DBA9567}" type="datetimeFigureOut">
               <a:rPr lang="en-US" smtClean="0"/>
               <a:pPr/>
-              <a:t>1/24/2020</a:t>
+              <a:t>4/5/2020</a:t>
             </a:fld>
             <a:endParaRPr lang="en-US" dirty="0"/>
           </a:p>
@@ -1667,7 +1667,7 @@
             <a:fld id="{B61BEF0D-F0BB-DE4B-95CE-6DB70DBA9567}" type="datetimeFigureOut">
               <a:rPr lang="en-US" smtClean="0"/>
               <a:pPr/>
-              <a:t>1/24/2020</a:t>
+              <a:t>4/5/2020</a:t>
             </a:fld>
             <a:endParaRPr lang="en-US" dirty="0"/>
           </a:p>
@@ -1916,7 +1916,7 @@
             <a:fld id="{B61BEF0D-F0BB-DE4B-95CE-6DB70DBA9567}" type="datetimeFigureOut">
               <a:rPr lang="en-US" smtClean="0"/>
               <a:pPr/>
-              <a:t>1/24/2020</a:t>
+              <a:t>4/5/2020</a:t>
             </a:fld>
             <a:endParaRPr lang="en-US" dirty="0"/>
           </a:p>
@@ -2149,7 +2149,7 @@
           <a:p>
             <a:fld id="{EB712588-04B1-427B-82EE-E8DB90309F08}" type="datetimeFigureOut">
               <a:rPr lang="en-US" smtClean="0"/>
-              <a:t>1/24/2020</a:t>
+              <a:t>4/5/2020</a:t>
             </a:fld>
             <a:endParaRPr lang="en-US" dirty="0"/>
           </a:p>
@@ -2524,7 +2524,7 @@
             <a:fld id="{B61BEF0D-F0BB-DE4B-95CE-6DB70DBA9567}" type="datetimeFigureOut">
               <a:rPr lang="en-US" smtClean="0"/>
               <a:pPr/>
-              <a:t>1/24/2020</a:t>
+              <a:t>4/5/2020</a:t>
             </a:fld>
             <a:endParaRPr lang="en-US" dirty="0"/>
           </a:p>
@@ -2649,7 +2649,7 @@
             <a:fld id="{B61BEF0D-F0BB-DE4B-95CE-6DB70DBA9567}" type="datetimeFigureOut">
               <a:rPr lang="en-US" smtClean="0"/>
               <a:pPr/>
-              <a:t>1/24/2020</a:t>
+              <a:t>4/5/2020</a:t>
             </a:fld>
             <a:endParaRPr lang="en-US" dirty="0"/>
           </a:p>
@@ -2746,7 +2746,7 @@
             <a:fld id="{B61BEF0D-F0BB-DE4B-95CE-6DB70DBA9567}" type="datetimeFigureOut">
               <a:rPr lang="en-US" smtClean="0"/>
               <a:pPr/>
-              <a:t>1/24/2020</a:t>
+              <a:t>4/5/2020</a:t>
             </a:fld>
             <a:endParaRPr lang="en-US" dirty="0"/>
           </a:p>
@@ -3002,7 +3002,7 @@
           <a:p>
             <a:fld id="{42A54C80-263E-416B-A8E0-580EDEADCBDC}" type="datetimeFigureOut">
               <a:rPr lang="en-US" smtClean="0"/>
-              <a:t>1/24/2020</a:t>
+              <a:t>4/5/2020</a:t>
             </a:fld>
             <a:endParaRPr lang="en-US" dirty="0"/>
           </a:p>
@@ -3189,7 +3189,7 @@
             <a:fld id="{B61BEF0D-F0BB-DE4B-95CE-6DB70DBA9567}" type="datetimeFigureOut">
               <a:rPr lang="en-US" smtClean="0"/>
               <a:pPr/>
-              <a:t>1/24/2020</a:t>
+              <a:t>4/5/2020</a:t>
             </a:fld>
             <a:endParaRPr lang="en-US" dirty="0"/>
           </a:p>
@@ -3509,7 +3509,7 @@
             <a:fld id="{B61BEF0D-F0BB-DE4B-95CE-6DB70DBA9567}" type="datetimeFigureOut">
               <a:rPr lang="en-US" smtClean="0"/>
               <a:pPr/>
-              <a:t>1/24/2020</a:t>
+              <a:t>4/5/2020</a:t>
             </a:fld>
             <a:endParaRPr lang="en-US" dirty="0"/>
           </a:p>
@@ -3719,7 +3719,7 @@
             <a:fld id="{B61BEF0D-F0BB-DE4B-95CE-6DB70DBA9567}" type="datetimeFigureOut">
               <a:rPr lang="en-US" smtClean="0"/>
               <a:pPr/>
-              <a:t>1/24/2020</a:t>
+              <a:t>4/5/2020</a:t>
             </a:fld>
             <a:endParaRPr lang="en-US" dirty="0"/>
           </a:p>
@@ -4035,7 +4035,7 @@
             <a:fld id="{B61BEF0D-F0BB-DE4B-95CE-6DB70DBA9567}" type="datetimeFigureOut">
               <a:rPr lang="en-US" smtClean="0"/>
               <a:pPr/>
-              <a:t>1/24/2020</a:t>
+              <a:t>4/5/2020</a:t>
             </a:fld>
             <a:endParaRPr lang="en-US" dirty="0"/>
           </a:p>
@@ -4370,7 +4370,7 @@
             <a:fld id="{B61BEF0D-F0BB-DE4B-95CE-6DB70DBA9567}" type="datetimeFigureOut">
               <a:rPr lang="en-US" smtClean="0"/>
               <a:pPr/>
-              <a:t>1/24/2020</a:t>
+              <a:t>4/5/2020</a:t>
             </a:fld>
             <a:endParaRPr lang="en-US" dirty="0"/>
           </a:p>
@@ -4686,7 +4686,7 @@
             <a:fld id="{B61BEF0D-F0BB-DE4B-95CE-6DB70DBA9567}" type="datetimeFigureOut">
               <a:rPr lang="en-US" smtClean="0"/>
               <a:pPr/>
-              <a:t>1/24/2020</a:t>
+              <a:t>4/5/2020</a:t>
             </a:fld>
             <a:endParaRPr lang="en-US" dirty="0"/>
           </a:p>
@@ -5081,7 +5081,7 @@
             <a:fld id="{B61BEF0D-F0BB-DE4B-95CE-6DB70DBA9567}" type="datetimeFigureOut">
               <a:rPr lang="en-US" smtClean="0"/>
               <a:pPr/>
-              <a:t>1/24/2020</a:t>
+              <a:t>4/5/2020</a:t>
             </a:fld>
             <a:endParaRPr lang="en-US" dirty="0"/>
           </a:p>
@@ -5252,7 +5252,7 @@
           <a:p>
             <a:fld id="{55C6B4A9-1611-4792-9094-5F34BCA07E0B}" type="datetimeFigureOut">
               <a:rPr lang="en-US" smtClean="0"/>
-              <a:t>1/24/2020</a:t>
+              <a:t>4/5/2020</a:t>
             </a:fld>
             <a:endParaRPr lang="en-US" dirty="0"/>
           </a:p>
@@ -5433,7 +5433,7 @@
             <a:fld id="{B61BEF0D-F0BB-DE4B-95CE-6DB70DBA9567}" type="datetimeFigureOut">
               <a:rPr lang="en-US" smtClean="0"/>
               <a:pPr/>
-              <a:t>1/24/2020</a:t>
+              <a:t>4/5/2020</a:t>
             </a:fld>
             <a:endParaRPr lang="en-US" dirty="0"/>
           </a:p>
@@ -5698,7 +5698,7 @@
             <a:fld id="{B61BEF0D-F0BB-DE4B-95CE-6DB70DBA9567}" type="datetimeFigureOut">
               <a:rPr lang="en-US" smtClean="0"/>
               <a:pPr/>
-              <a:t>1/24/2020</a:t>
+              <a:t>4/5/2020</a:t>
             </a:fld>
             <a:endParaRPr lang="en-US" dirty="0"/>
           </a:p>
@@ -5964,7 +5964,7 @@
           <a:p>
             <a:fld id="{EB712588-04B1-427B-82EE-E8DB90309F08}" type="datetimeFigureOut">
               <a:rPr lang="en-US" smtClean="0"/>
-              <a:t>1/24/2020</a:t>
+              <a:t>4/5/2020</a:t>
             </a:fld>
             <a:endParaRPr lang="en-US" dirty="0"/>
           </a:p>
@@ -6377,7 +6377,7 @@
             <a:fld id="{B61BEF0D-F0BB-DE4B-95CE-6DB70DBA9567}" type="datetimeFigureOut">
               <a:rPr lang="en-US" smtClean="0"/>
               <a:pPr/>
-              <a:t>1/24/2020</a:t>
+              <a:t>4/5/2020</a:t>
             </a:fld>
             <a:endParaRPr lang="en-US" dirty="0"/>
           </a:p>
@@ -6520,7 +6520,7 @@
             <a:fld id="{B61BEF0D-F0BB-DE4B-95CE-6DB70DBA9567}" type="datetimeFigureOut">
               <a:rPr lang="en-US" smtClean="0"/>
               <a:pPr/>
-              <a:t>1/24/2020</a:t>
+              <a:t>4/5/2020</a:t>
             </a:fld>
             <a:endParaRPr lang="en-US" dirty="0"/>
           </a:p>
@@ -6635,7 +6635,7 @@
             <a:fld id="{B61BEF0D-F0BB-DE4B-95CE-6DB70DBA9567}" type="datetimeFigureOut">
               <a:rPr lang="en-US" smtClean="0"/>
               <a:pPr/>
-              <a:t>1/24/2020</a:t>
+              <a:t>4/5/2020</a:t>
             </a:fld>
             <a:endParaRPr lang="en-US" dirty="0"/>
           </a:p>
@@ -6947,7 +6947,7 @@
           <a:p>
             <a:fld id="{42A54C80-263E-416B-A8E0-580EDEADCBDC}" type="datetimeFigureOut">
               <a:rPr lang="en-US" smtClean="0"/>
-              <a:t>1/24/2020</a:t>
+              <a:t>4/5/2020</a:t>
             </a:fld>
             <a:endParaRPr lang="en-US" dirty="0"/>
           </a:p>
@@ -7236,7 +7236,7 @@
             <a:fld id="{B61BEF0D-F0BB-DE4B-95CE-6DB70DBA9567}" type="datetimeFigureOut">
               <a:rPr lang="en-US" smtClean="0"/>
               <a:pPr/>
-              <a:t>1/24/2020</a:t>
+              <a:t>4/5/2020</a:t>
             </a:fld>
             <a:endParaRPr lang="en-US" dirty="0"/>
           </a:p>
@@ -7479,7 +7479,7 @@
             <a:fld id="{B61BEF0D-F0BB-DE4B-95CE-6DB70DBA9567}" type="datetimeFigureOut">
               <a:rPr lang="en-US" smtClean="0"/>
               <a:pPr/>
-              <a:t>1/24/2020</a:t>
+              <a:t>4/5/2020</a:t>
             </a:fld>
             <a:endParaRPr lang="en-US" dirty="0"/>
           </a:p>
@@ -8564,7 +8564,7 @@
             <a:fld id="{B61BEF0D-F0BB-DE4B-95CE-6DB70DBA9567}" type="datetimeFigureOut">
               <a:rPr lang="en-US" smtClean="0"/>
               <a:pPr/>
-              <a:t>1/24/2020</a:t>
+              <a:t>4/5/2020</a:t>
             </a:fld>
             <a:endParaRPr lang="en-US" dirty="0"/>
           </a:p>
@@ -9428,8 +9428,8 @@
           </a:p>
         </p:txBody>
       </p:sp>
-      <mc:AlternateContent xmlns:mc="http://schemas.openxmlformats.org/markup-compatibility/2006" xmlns:a14="http://schemas.microsoft.com/office/drawing/2010/main">
-        <mc:Choice Requires="a14">
+      <mc:AlternateContent xmlns:mc="http://schemas.openxmlformats.org/markup-compatibility/2006">
+        <mc:Choice xmlns:a14="http://schemas.microsoft.com/office/drawing/2010/main" Requires="a14">
           <p:sp>
             <p:nvSpPr>
               <p:cNvPr id="3" name="Marcador de contenido 2">
@@ -9486,7 +9486,27 @@
                     <a:latin typeface="Calibri" panose="020F0502020204030204" pitchFamily="34" charset="0"/>
                     <a:cs typeface="Calibri" panose="020F0502020204030204" pitchFamily="34" charset="0"/>
                   </a:rPr>
-                  <a:t>”, que son los valores de las nuevas variables.</a:t>
+                  <a:t>”, que son los </a:t>
+                </a:r>
+                <a:r>
+                  <a:rPr lang="es-ES" sz="2000" dirty="0">
+                    <a:solidFill>
+                      <a:srgbClr val="FFFF00"/>
+                    </a:solidFill>
+                    <a:latin typeface="Calibri" panose="020F0502020204030204" pitchFamily="34" charset="0"/>
+                    <a:cs typeface="Calibri" panose="020F0502020204030204" pitchFamily="34" charset="0"/>
+                  </a:rPr>
+                  <a:t>valores de las nuevas variables</a:t>
+                </a:r>
+                <a:r>
+                  <a:rPr lang="es-ES" sz="2000" dirty="0">
+                    <a:solidFill>
+                      <a:schemeClr val="bg1"/>
+                    </a:solidFill>
+                    <a:latin typeface="Calibri" panose="020F0502020204030204" pitchFamily="34" charset="0"/>
+                    <a:cs typeface="Calibri" panose="020F0502020204030204" pitchFamily="34" charset="0"/>
+                  </a:rPr>
+                  <a:t>.</a:t>
                 </a:r>
               </a:p>
               <a:p>
@@ -9518,6 +9538,30 @@
                     <a:cs typeface="Calibri" panose="020F0502020204030204" pitchFamily="34" charset="0"/>
                   </a:rPr>
                   <a:t>matriz de covarianza muestral </a:t>
+                </a:r>
+                <a14:m>
+                  <m:oMath xmlns:m="http://schemas.openxmlformats.org/officeDocument/2006/math">
+                    <m:r>
+                      <a:rPr lang="es-ES" sz="2000" i="1" smtClean="0">
+                        <a:solidFill>
+                          <a:srgbClr val="FFC000"/>
+                        </a:solidFill>
+                        <a:latin typeface="Cambria Math" panose="02040503050406030204" pitchFamily="18" charset="0"/>
+                        <a:cs typeface="Calibri" panose="020F0502020204030204" pitchFamily="34" charset="0"/>
+                      </a:rPr>
+                      <m:t>𝑆</m:t>
+                    </m:r>
+                  </m:oMath>
+                </a14:m>
+                <a:r>
+                  <a:rPr lang="es-ES" sz="2000" dirty="0">
+                    <a:solidFill>
+                      <a:srgbClr val="FFC000"/>
+                    </a:solidFill>
+                    <a:latin typeface="Calibri" panose="020F0502020204030204" pitchFamily="34" charset="0"/>
+                    <a:cs typeface="Calibri" panose="020F0502020204030204" pitchFamily="34" charset="0"/>
+                  </a:rPr>
+                  <a:t> </a:t>
                 </a:r>
                 <a:r>
                   <a:rPr lang="es-ES" sz="2000" dirty="0">
@@ -9551,7 +9595,7 @@
                     <a:latin typeface="Calibri" panose="020F0502020204030204" pitchFamily="34" charset="0"/>
                     <a:cs typeface="Calibri" panose="020F0502020204030204" pitchFamily="34" charset="0"/>
                   </a:rPr>
-                  <a:t> </a:t>
+                  <a:t>, </a:t>
                 </a:r>
                 <a:r>
                   <a:rPr lang="es-ES" sz="2000" dirty="0">
@@ -9850,7 +9894,139 @@
                     <a:latin typeface="Calibri" panose="020F0502020204030204" pitchFamily="34" charset="0"/>
                     <a:cs typeface="Calibri" panose="020F0502020204030204" pitchFamily="34" charset="0"/>
                   </a:rPr>
-                  <a:t> es la matriz que contiene a los auto-vectores de </a:t>
+                  <a:t> es la matriz que contiene a los </a:t>
+                </a:r>
+                <a:r>
+                  <a:rPr lang="es-ES" sz="2000" b="0" dirty="0">
+                    <a:solidFill>
+                      <a:srgbClr val="92D050"/>
+                    </a:solidFill>
+                    <a:latin typeface="Calibri" panose="020F0502020204030204" pitchFamily="34" charset="0"/>
+                    <a:cs typeface="Calibri" panose="020F0502020204030204" pitchFamily="34" charset="0"/>
+                  </a:rPr>
+                  <a:t>auto-vectores </a:t>
+                </a:r>
+                <a14:m>
+                  <m:oMath xmlns:m="http://schemas.openxmlformats.org/officeDocument/2006/math">
+                    <m:sSubSup>
+                      <m:sSubSupPr>
+                        <m:ctrlPr>
+                          <a:rPr lang="es-ES" sz="2000" b="0" i="1" smtClean="0">
+                            <a:solidFill>
+                              <a:srgbClr val="92D050"/>
+                            </a:solidFill>
+                            <a:latin typeface="Cambria Math" panose="02040503050406030204" pitchFamily="18" charset="0"/>
+                            <a:cs typeface="Calibri" panose="020F0502020204030204" pitchFamily="34" charset="0"/>
+                          </a:rPr>
+                        </m:ctrlPr>
+                      </m:sSubSupPr>
+                      <m:e>
+                        <m:r>
+                          <a:rPr lang="es-ES" sz="2000" b="0" i="1" smtClean="0">
+                            <a:solidFill>
+                              <a:srgbClr val="92D050"/>
+                            </a:solidFill>
+                            <a:latin typeface="Cambria Math" panose="02040503050406030204" pitchFamily="18" charset="0"/>
+                            <a:cs typeface="Calibri" panose="020F0502020204030204" pitchFamily="34" charset="0"/>
+                          </a:rPr>
+                          <m:t>𝑎</m:t>
+                        </m:r>
+                      </m:e>
+                      <m:sub>
+                        <m:r>
+                          <a:rPr lang="es-ES" sz="2000" b="0" i="1" smtClean="0">
+                            <a:solidFill>
+                              <a:srgbClr val="92D050"/>
+                            </a:solidFill>
+                            <a:latin typeface="Cambria Math" panose="02040503050406030204" pitchFamily="18" charset="0"/>
+                            <a:cs typeface="Calibri" panose="020F0502020204030204" pitchFamily="34" charset="0"/>
+                          </a:rPr>
+                          <m:t>1</m:t>
+                        </m:r>
+                      </m:sub>
+                      <m:sup>
+                        <m:r>
+                          <a:rPr lang="es-ES" sz="2000" b="0" i="1" smtClean="0">
+                            <a:solidFill>
+                              <a:srgbClr val="92D050"/>
+                            </a:solidFill>
+                            <a:latin typeface="Cambria Math" panose="02040503050406030204" pitchFamily="18" charset="0"/>
+                            <a:cs typeface="Calibri" panose="020F0502020204030204" pitchFamily="34" charset="0"/>
+                          </a:rPr>
+                          <m:t>𝑆</m:t>
+                        </m:r>
+                      </m:sup>
+                    </m:sSubSup>
+                    <m:r>
+                      <a:rPr lang="es-ES" sz="2000" b="0" i="1" smtClean="0">
+                        <a:solidFill>
+                          <a:srgbClr val="92D050"/>
+                        </a:solidFill>
+                        <a:latin typeface="Cambria Math" panose="02040503050406030204" pitchFamily="18" charset="0"/>
+                        <a:cs typeface="Calibri" panose="020F0502020204030204" pitchFamily="34" charset="0"/>
+                      </a:rPr>
+                      <m:t>,…,</m:t>
+                    </m:r>
+                    <m:sSubSup>
+                      <m:sSubSupPr>
+                        <m:ctrlPr>
+                          <a:rPr lang="es-ES" sz="2000" b="0" i="1" smtClean="0">
+                            <a:solidFill>
+                              <a:srgbClr val="92D050"/>
+                            </a:solidFill>
+                            <a:latin typeface="Cambria Math" panose="02040503050406030204" pitchFamily="18" charset="0"/>
+                            <a:cs typeface="Calibri" panose="020F0502020204030204" pitchFamily="34" charset="0"/>
+                          </a:rPr>
+                        </m:ctrlPr>
+                      </m:sSubSupPr>
+                      <m:e>
+                        <m:r>
+                          <a:rPr lang="es-ES" sz="2000" b="0" i="1" smtClean="0">
+                            <a:solidFill>
+                              <a:srgbClr val="92D050"/>
+                            </a:solidFill>
+                            <a:latin typeface="Cambria Math" panose="02040503050406030204" pitchFamily="18" charset="0"/>
+                            <a:cs typeface="Calibri" panose="020F0502020204030204" pitchFamily="34" charset="0"/>
+                          </a:rPr>
+                          <m:t>𝑎</m:t>
+                        </m:r>
+                      </m:e>
+                      <m:sub>
+                        <m:r>
+                          <a:rPr lang="es-ES" sz="2000" b="0" i="1" smtClean="0">
+                            <a:solidFill>
+                              <a:srgbClr val="92D050"/>
+                            </a:solidFill>
+                            <a:latin typeface="Cambria Math" panose="02040503050406030204" pitchFamily="18" charset="0"/>
+                            <a:cs typeface="Calibri" panose="020F0502020204030204" pitchFamily="34" charset="0"/>
+                          </a:rPr>
+                          <m:t>𝑟</m:t>
+                        </m:r>
+                      </m:sub>
+                      <m:sup>
+                        <m:r>
+                          <a:rPr lang="es-ES" sz="2000" b="0" i="1" smtClean="0">
+                            <a:solidFill>
+                              <a:srgbClr val="92D050"/>
+                            </a:solidFill>
+                            <a:latin typeface="Cambria Math" panose="02040503050406030204" pitchFamily="18" charset="0"/>
+                            <a:cs typeface="Calibri" panose="020F0502020204030204" pitchFamily="34" charset="0"/>
+                          </a:rPr>
+                          <m:t>𝑆</m:t>
+                        </m:r>
+                      </m:sup>
+                    </m:sSubSup>
+                  </m:oMath>
+                </a14:m>
+                <a:r>
+                  <a:rPr lang="es-ES" sz="2000" b="0" dirty="0">
+                    <a:solidFill>
+                      <a:schemeClr val="bg1"/>
+                    </a:solidFill>
+                    <a:latin typeface="Calibri" panose="020F0502020204030204" pitchFamily="34" charset="0"/>
+                    <a:cs typeface="Calibri" panose="020F0502020204030204" pitchFamily="34" charset="0"/>
+                  </a:rPr>
+                  <a:t> de </a:t>
                 </a:r>
                 <a14:m>
                   <m:oMath xmlns:m="http://schemas.openxmlformats.org/officeDocument/2006/math">
@@ -9908,7 +10084,7 @@
                     <m:r>
                       <a:rPr lang="es-ES" sz="2000" b="0" i="1" smtClean="0">
                         <a:solidFill>
-                          <a:schemeClr val="bg1"/>
+                          <a:srgbClr val="92D050"/>
                         </a:solidFill>
                         <a:latin typeface="Cambria Math" panose="02040503050406030204" pitchFamily="18" charset="0"/>
                         <a:cs typeface="Calibri" panose="020F0502020204030204" pitchFamily="34" charset="0"/>
@@ -9920,12 +10096,134 @@
                 <a:r>
                   <a:rPr lang="es-ES" sz="2000" b="0" dirty="0">
                     <a:solidFill>
+                      <a:srgbClr val="92D050"/>
+                    </a:solidFill>
+                    <a:latin typeface="Calibri" panose="020F0502020204030204" pitchFamily="34" charset="0"/>
+                    <a:cs typeface="Calibri" panose="020F0502020204030204" pitchFamily="34" charset="0"/>
+                  </a:rPr>
+                  <a:t> mayores auto-valores </a:t>
+                </a:r>
+                <a14:m>
+                  <m:oMath xmlns:m="http://schemas.openxmlformats.org/officeDocument/2006/math">
+                    <m:sSubSup>
+                      <m:sSubSupPr>
+                        <m:ctrlPr>
+                          <a:rPr lang="es-ES" b="0" i="1" smtClean="0">
+                            <a:solidFill>
+                              <a:srgbClr val="92D050"/>
+                            </a:solidFill>
+                            <a:latin typeface="Cambria Math" panose="02040503050406030204" pitchFamily="18" charset="0"/>
+                            <a:cs typeface="Calibri" panose="020F0502020204030204" pitchFamily="34" charset="0"/>
+                          </a:rPr>
+                        </m:ctrlPr>
+                      </m:sSubSupPr>
+                      <m:e>
+                        <m:r>
+                          <a:rPr lang="es-ES" b="0" i="1" smtClean="0">
+                            <a:solidFill>
+                              <a:srgbClr val="92D050"/>
+                            </a:solidFill>
+                            <a:latin typeface="Cambria Math" panose="02040503050406030204" pitchFamily="18" charset="0"/>
+                            <a:cs typeface="Calibri" panose="020F0502020204030204" pitchFamily="34" charset="0"/>
+                          </a:rPr>
+                          <m:t>𝜆</m:t>
+                        </m:r>
+                      </m:e>
+                      <m:sub>
+                        <m:r>
+                          <a:rPr lang="es-ES" b="0" i="1" smtClean="0">
+                            <a:solidFill>
+                              <a:srgbClr val="92D050"/>
+                            </a:solidFill>
+                            <a:latin typeface="Cambria Math" panose="02040503050406030204" pitchFamily="18" charset="0"/>
+                            <a:cs typeface="Calibri" panose="020F0502020204030204" pitchFamily="34" charset="0"/>
+                          </a:rPr>
+                          <m:t>1</m:t>
+                        </m:r>
+                      </m:sub>
+                      <m:sup>
+                        <m:r>
+                          <a:rPr lang="es-ES" b="0" i="1" smtClean="0">
+                            <a:solidFill>
+                              <a:srgbClr val="92D050"/>
+                            </a:solidFill>
+                            <a:latin typeface="Cambria Math" panose="02040503050406030204" pitchFamily="18" charset="0"/>
+                            <a:cs typeface="Calibri" panose="020F0502020204030204" pitchFamily="34" charset="0"/>
+                          </a:rPr>
+                          <m:t>𝑆</m:t>
+                        </m:r>
+                      </m:sup>
+                    </m:sSubSup>
+                    <m:r>
+                      <a:rPr lang="es-ES" b="0" i="1" smtClean="0">
+                        <a:solidFill>
+                          <a:srgbClr val="92D050"/>
+                        </a:solidFill>
+                        <a:latin typeface="Cambria Math" panose="02040503050406030204" pitchFamily="18" charset="0"/>
+                        <a:cs typeface="Calibri" panose="020F0502020204030204" pitchFamily="34" charset="0"/>
+                      </a:rPr>
+                      <m:t>,…,</m:t>
+                    </m:r>
+                    <m:sSubSup>
+                      <m:sSubSupPr>
+                        <m:ctrlPr>
+                          <a:rPr lang="es-ES" b="0" i="1" smtClean="0">
+                            <a:solidFill>
+                              <a:srgbClr val="92D050"/>
+                            </a:solidFill>
+                            <a:latin typeface="Cambria Math" panose="02040503050406030204" pitchFamily="18" charset="0"/>
+                            <a:cs typeface="Calibri" panose="020F0502020204030204" pitchFamily="34" charset="0"/>
+                          </a:rPr>
+                        </m:ctrlPr>
+                      </m:sSubSupPr>
+                      <m:e>
+                        <m:r>
+                          <a:rPr lang="es-ES" b="0" i="1" smtClean="0">
+                            <a:solidFill>
+                              <a:srgbClr val="92D050"/>
+                            </a:solidFill>
+                            <a:latin typeface="Cambria Math" panose="02040503050406030204" pitchFamily="18" charset="0"/>
+                            <a:cs typeface="Calibri" panose="020F0502020204030204" pitchFamily="34" charset="0"/>
+                          </a:rPr>
+                          <m:t>𝜆</m:t>
+                        </m:r>
+                      </m:e>
+                      <m:sub>
+                        <m:r>
+                          <a:rPr lang="es-ES" b="0" i="1" smtClean="0">
+                            <a:solidFill>
+                              <a:srgbClr val="92D050"/>
+                            </a:solidFill>
+                            <a:latin typeface="Cambria Math" panose="02040503050406030204" pitchFamily="18" charset="0"/>
+                            <a:cs typeface="Calibri" panose="020F0502020204030204" pitchFamily="34" charset="0"/>
+                          </a:rPr>
+                          <m:t>𝑟</m:t>
+                        </m:r>
+                      </m:sub>
+                      <m:sup>
+                        <m:r>
+                          <a:rPr lang="es-ES" b="0" i="1" smtClean="0">
+                            <a:solidFill>
+                              <a:srgbClr val="92D050"/>
+                            </a:solidFill>
+                            <a:latin typeface="Cambria Math" panose="02040503050406030204" pitchFamily="18" charset="0"/>
+                            <a:cs typeface="Calibri" panose="020F0502020204030204" pitchFamily="34" charset="0"/>
+                          </a:rPr>
+                          <m:t>𝑆</m:t>
+                        </m:r>
+                      </m:sup>
+                    </m:sSubSup>
+                  </m:oMath>
+                </a14:m>
+                <a:r>
+                  <a:rPr lang="es-ES" sz="2000" b="0" dirty="0">
+                    <a:solidFill>
                       <a:schemeClr val="bg1"/>
                     </a:solidFill>
                     <a:latin typeface="Calibri" panose="020F0502020204030204" pitchFamily="34" charset="0"/>
                     <a:cs typeface="Calibri" panose="020F0502020204030204" pitchFamily="34" charset="0"/>
                   </a:rPr>
-                  <a:t> mayores auto-valores.</a:t>
+                  <a:t>.</a:t>
                 </a:r>
               </a:p>
               <a:p>
@@ -9949,7 +10247,7 @@
             </p:txBody>
           </p:sp>
         </mc:Choice>
-        <mc:Fallback xmlns="">
+        <mc:Fallback>
           <p:sp>
             <p:nvSpPr>
               <p:cNvPr id="3" name="Marcador de contenido 2">
@@ -10062,8 +10360,8 @@
           </a:p>
         </p:txBody>
       </p:sp>
-      <mc:AlternateContent xmlns:mc="http://schemas.openxmlformats.org/markup-compatibility/2006" xmlns:a14="http://schemas.microsoft.com/office/drawing/2010/main">
-        <mc:Choice Requires="a14">
+      <mc:AlternateContent xmlns:mc="http://schemas.openxmlformats.org/markup-compatibility/2006">
+        <mc:Choice xmlns:a14="http://schemas.microsoft.com/office/drawing/2010/main" Requires="a14">
           <p:sp>
             <p:nvSpPr>
               <p:cNvPr id="3" name="Marcador de contenido 2">
@@ -10083,7 +10381,7 @@
             <p:spPr>
               <a:xfrm>
                 <a:off x="677334" y="1556189"/>
-                <a:ext cx="9188562" cy="4932584"/>
+                <a:ext cx="9025959" cy="4932584"/>
               </a:xfrm>
             </p:spPr>
             <p:txBody>
@@ -10100,58 +10398,41 @@
                     <a:latin typeface="Calibri" panose="020F0502020204030204" pitchFamily="34" charset="0"/>
                     <a:cs typeface="Calibri" panose="020F0502020204030204" pitchFamily="34" charset="0"/>
                   </a:rPr>
-                  <a:t>En la práctica, los datos pueden ser representados por los “</a:t>
-                </a:r>
-                <a:r>
-                  <a:rPr lang="es-ES" sz="2000" dirty="0">
-                    <a:solidFill>
-                      <a:srgbClr val="92D050"/>
-                    </a:solidFill>
-                    <a:latin typeface="Calibri" panose="020F0502020204030204" pitchFamily="34" charset="0"/>
-                    <a:cs typeface="Calibri" panose="020F0502020204030204" pitchFamily="34" charset="0"/>
-                  </a:rPr>
-                  <a:t>principal component scores</a:t>
-                </a:r>
-                <a:r>
-                  <a:rPr lang="es-ES" sz="2000" dirty="0">
-                    <a:solidFill>
-                      <a:schemeClr val="bg1"/>
-                    </a:solidFill>
-                    <a:latin typeface="Calibri" panose="020F0502020204030204" pitchFamily="34" charset="0"/>
-                    <a:cs typeface="Calibri" panose="020F0502020204030204" pitchFamily="34" charset="0"/>
-                  </a:rPr>
-                  <a:t>”, que son los valores de las nuevas variables.</a:t>
-                </a:r>
-              </a:p>
-              <a:p>
-                <a:endParaRPr lang="es-ES" sz="2000" dirty="0">
-                  <a:solidFill>
-                    <a:schemeClr val="bg1"/>
-                  </a:solidFill>
-                  <a:latin typeface="Calibri" panose="020F0502020204030204" pitchFamily="34" charset="0"/>
-                  <a:cs typeface="Calibri" panose="020F0502020204030204" pitchFamily="34" charset="0"/>
-                </a:endParaRPr>
-              </a:p>
-              <a:p>
-                <a:r>
-                  <a:rPr lang="es-ES" sz="2000" dirty="0">
-                    <a:solidFill>
-                      <a:schemeClr val="bg1"/>
-                    </a:solidFill>
-                    <a:latin typeface="Calibri" panose="020F0502020204030204" pitchFamily="34" charset="0"/>
-                    <a:cs typeface="Calibri" panose="020F0502020204030204" pitchFamily="34" charset="0"/>
-                  </a:rPr>
                   <a:t>Si hemos usado la </a:t>
                 </a:r>
                 <a:r>
                   <a:rPr lang="es-ES" sz="2000" dirty="0">
                     <a:solidFill>
-                      <a:srgbClr val="FFC000"/>
+                      <a:srgbClr val="00B0F0"/>
                     </a:solidFill>
                     <a:latin typeface="Calibri" panose="020F0502020204030204" pitchFamily="34" charset="0"/>
                     <a:cs typeface="Calibri" panose="020F0502020204030204" pitchFamily="34" charset="0"/>
                   </a:rPr>
                   <a:t>matriz de correlaciones muestrales </a:t>
+                </a:r>
+                <a14:m>
+                  <m:oMath xmlns:m="http://schemas.openxmlformats.org/officeDocument/2006/math">
+                    <m:r>
+                      <a:rPr lang="es-ES" sz="2000" i="1">
+                        <a:solidFill>
+                          <a:srgbClr val="00B0F0"/>
+                        </a:solidFill>
+                        <a:latin typeface="Cambria Math" panose="02040503050406030204" pitchFamily="18" charset="0"/>
+                        <a:cs typeface="Calibri" panose="020F0502020204030204" pitchFamily="34" charset="0"/>
+                      </a:rPr>
+                      <m:t>𝑅</m:t>
+                    </m:r>
+                  </m:oMath>
+                </a14:m>
+                <a:r>
+                  <a:rPr lang="es-ES" sz="2000" dirty="0">
+                    <a:solidFill>
+                      <a:srgbClr val="00B0F0"/>
+                    </a:solidFill>
+                    <a:latin typeface="Calibri" panose="020F0502020204030204" pitchFamily="34" charset="0"/>
+                    <a:cs typeface="Calibri" panose="020F0502020204030204" pitchFamily="34" charset="0"/>
+                  </a:rPr>
+                  <a:t> </a:t>
                 </a:r>
                 <a:r>
                   <a:rPr lang="es-ES" sz="2000" dirty="0">
@@ -10185,7 +10466,7 @@
                     <a:latin typeface="Calibri" panose="020F0502020204030204" pitchFamily="34" charset="0"/>
                     <a:cs typeface="Calibri" panose="020F0502020204030204" pitchFamily="34" charset="0"/>
                   </a:rPr>
-                  <a:t> </a:t>
+                  <a:t>, </a:t>
                 </a:r>
                 <a:r>
                   <a:rPr lang="es-ES" sz="2000" dirty="0">
@@ -10676,7 +10957,149 @@
                     <a:latin typeface="Calibri" panose="020F0502020204030204" pitchFamily="34" charset="0"/>
                     <a:cs typeface="Calibri" panose="020F0502020204030204" pitchFamily="34" charset="0"/>
                   </a:rPr>
-                  <a:t> es la matriz que contiene a los auto-vectores de la matriz de correlaciones de los datos originales </a:t>
+                  <a:t> es la matriz que contiene a los </a:t>
+                </a:r>
+                <a:r>
+                  <a:rPr lang="es-ES" sz="2000" dirty="0">
+                    <a:solidFill>
+                      <a:srgbClr val="92D050"/>
+                    </a:solidFill>
+                    <a:latin typeface="Calibri" panose="020F0502020204030204" pitchFamily="34" charset="0"/>
+                    <a:cs typeface="Calibri" panose="020F0502020204030204" pitchFamily="34" charset="0"/>
+                  </a:rPr>
+                  <a:t>auto-vectores </a:t>
+                </a:r>
+                <a14:m>
+                  <m:oMath xmlns:m="http://schemas.openxmlformats.org/officeDocument/2006/math">
+                    <m:sSubSup>
+                      <m:sSubSupPr>
+                        <m:ctrlPr>
+                          <a:rPr lang="es-ES" sz="2000" i="1">
+                            <a:solidFill>
+                              <a:srgbClr val="92D050"/>
+                            </a:solidFill>
+                            <a:latin typeface="Cambria Math" panose="02040503050406030204" pitchFamily="18" charset="0"/>
+                            <a:cs typeface="Calibri" panose="020F0502020204030204" pitchFamily="34" charset="0"/>
+                          </a:rPr>
+                        </m:ctrlPr>
+                      </m:sSubSupPr>
+                      <m:e>
+                        <m:r>
+                          <a:rPr lang="es-ES" sz="2000" i="1">
+                            <a:solidFill>
+                              <a:srgbClr val="92D050"/>
+                            </a:solidFill>
+                            <a:latin typeface="Cambria Math" panose="02040503050406030204" pitchFamily="18" charset="0"/>
+                            <a:cs typeface="Calibri" panose="020F0502020204030204" pitchFamily="34" charset="0"/>
+                          </a:rPr>
+                          <m:t>𝑎</m:t>
+                        </m:r>
+                      </m:e>
+                      <m:sub>
+                        <m:r>
+                          <a:rPr lang="es-ES" sz="2000" i="1">
+                            <a:solidFill>
+                              <a:srgbClr val="92D050"/>
+                            </a:solidFill>
+                            <a:latin typeface="Cambria Math" panose="02040503050406030204" pitchFamily="18" charset="0"/>
+                            <a:cs typeface="Calibri" panose="020F0502020204030204" pitchFamily="34" charset="0"/>
+                          </a:rPr>
+                          <m:t>1</m:t>
+                        </m:r>
+                      </m:sub>
+                      <m:sup>
+                        <m:r>
+                          <a:rPr lang="es-ES" sz="2000" b="0" i="1" smtClean="0">
+                            <a:solidFill>
+                              <a:srgbClr val="92D050"/>
+                            </a:solidFill>
+                            <a:latin typeface="Cambria Math" panose="02040503050406030204" pitchFamily="18" charset="0"/>
+                            <a:cs typeface="Calibri" panose="020F0502020204030204" pitchFamily="34" charset="0"/>
+                          </a:rPr>
+                          <m:t>𝑅</m:t>
+                        </m:r>
+                      </m:sup>
+                    </m:sSubSup>
+                    <m:r>
+                      <a:rPr lang="es-ES" sz="2000" i="1">
+                        <a:solidFill>
+                          <a:srgbClr val="92D050"/>
+                        </a:solidFill>
+                        <a:latin typeface="Cambria Math" panose="02040503050406030204" pitchFamily="18" charset="0"/>
+                        <a:cs typeface="Calibri" panose="020F0502020204030204" pitchFamily="34" charset="0"/>
+                      </a:rPr>
+                      <m:t>,…,</m:t>
+                    </m:r>
+                    <m:sSubSup>
+                      <m:sSubSupPr>
+                        <m:ctrlPr>
+                          <a:rPr lang="es-ES" sz="2000" i="1">
+                            <a:solidFill>
+                              <a:srgbClr val="92D050"/>
+                            </a:solidFill>
+                            <a:latin typeface="Cambria Math" panose="02040503050406030204" pitchFamily="18" charset="0"/>
+                            <a:cs typeface="Calibri" panose="020F0502020204030204" pitchFamily="34" charset="0"/>
+                          </a:rPr>
+                        </m:ctrlPr>
+                      </m:sSubSupPr>
+                      <m:e>
+                        <m:r>
+                          <a:rPr lang="es-ES" sz="2000" i="1">
+                            <a:solidFill>
+                              <a:srgbClr val="92D050"/>
+                            </a:solidFill>
+                            <a:latin typeface="Cambria Math" panose="02040503050406030204" pitchFamily="18" charset="0"/>
+                            <a:cs typeface="Calibri" panose="020F0502020204030204" pitchFamily="34" charset="0"/>
+                          </a:rPr>
+                          <m:t>𝑎</m:t>
+                        </m:r>
+                      </m:e>
+                      <m:sub>
+                        <m:r>
+                          <a:rPr lang="es-ES" sz="2000" i="1">
+                            <a:solidFill>
+                              <a:srgbClr val="92D050"/>
+                            </a:solidFill>
+                            <a:latin typeface="Cambria Math" panose="02040503050406030204" pitchFamily="18" charset="0"/>
+                            <a:cs typeface="Calibri" panose="020F0502020204030204" pitchFamily="34" charset="0"/>
+                          </a:rPr>
+                          <m:t>𝑟</m:t>
+                        </m:r>
+                      </m:sub>
+                      <m:sup>
+                        <m:r>
+                          <a:rPr lang="es-ES" sz="2000" b="0" i="1" smtClean="0">
+                            <a:solidFill>
+                              <a:srgbClr val="92D050"/>
+                            </a:solidFill>
+                            <a:latin typeface="Cambria Math" panose="02040503050406030204" pitchFamily="18" charset="0"/>
+                            <a:cs typeface="Calibri" panose="020F0502020204030204" pitchFamily="34" charset="0"/>
+                          </a:rPr>
+                          <m:t>𝑅</m:t>
+                        </m:r>
+                      </m:sup>
+                    </m:sSubSup>
+                    <m:r>
+                      <a:rPr lang="es-ES" sz="2000" i="1">
+                        <a:solidFill>
+                          <a:srgbClr val="92D050"/>
+                        </a:solidFill>
+                        <a:latin typeface="Cambria Math" panose="02040503050406030204" pitchFamily="18" charset="0"/>
+                        <a:cs typeface="Calibri" panose="020F0502020204030204" pitchFamily="34" charset="0"/>
+                      </a:rPr>
+                      <m:t> </m:t>
+                    </m:r>
+                  </m:oMath>
+                </a14:m>
+                <a:r>
+                  <a:rPr lang="es-ES" sz="2000" b="0" dirty="0">
+                    <a:solidFill>
+                      <a:schemeClr val="bg1"/>
+                    </a:solidFill>
+                    <a:latin typeface="Calibri" panose="020F0502020204030204" pitchFamily="34" charset="0"/>
+                    <a:cs typeface="Calibri" panose="020F0502020204030204" pitchFamily="34" charset="0"/>
+                  </a:rPr>
+                  <a:t>de la matriz de correlaciones de los datos originales </a:t>
                 </a:r>
                 <a14:m>
                   <m:oMath xmlns:m="http://schemas.openxmlformats.org/officeDocument/2006/math">
@@ -10751,7 +11174,312 @@
                     <a:latin typeface="Calibri" panose="020F0502020204030204" pitchFamily="34" charset="0"/>
                     <a:cs typeface="Calibri" panose="020F0502020204030204" pitchFamily="34" charset="0"/>
                   </a:rPr>
-                  <a:t> mayores auto-valores. Y </a:t>
+                  <a:t> mayores </a:t>
+                </a:r>
+                <a:r>
+                  <a:rPr lang="es-ES" sz="2000" dirty="0">
+                    <a:solidFill>
+                      <a:srgbClr val="92D050"/>
+                    </a:solidFill>
+                    <a:latin typeface="Calibri" panose="020F0502020204030204" pitchFamily="34" charset="0"/>
+                    <a:cs typeface="Calibri" panose="020F0502020204030204" pitchFamily="34" charset="0"/>
+                  </a:rPr>
+                  <a:t>mayores auto-valores </a:t>
+                </a:r>
+                <a14:m>
+                  <m:oMath xmlns:m="http://schemas.openxmlformats.org/officeDocument/2006/math">
+                    <m:sSubSup>
+                      <m:sSubSupPr>
+                        <m:ctrlPr>
+                          <a:rPr lang="es-ES" i="1">
+                            <a:solidFill>
+                              <a:srgbClr val="92D050"/>
+                            </a:solidFill>
+                            <a:latin typeface="Cambria Math" panose="02040503050406030204" pitchFamily="18" charset="0"/>
+                            <a:cs typeface="Calibri" panose="020F0502020204030204" pitchFamily="34" charset="0"/>
+                          </a:rPr>
+                        </m:ctrlPr>
+                      </m:sSubSupPr>
+                      <m:e>
+                        <m:r>
+                          <a:rPr lang="es-ES" i="1">
+                            <a:solidFill>
+                              <a:srgbClr val="92D050"/>
+                            </a:solidFill>
+                            <a:latin typeface="Cambria Math" panose="02040503050406030204" pitchFamily="18" charset="0"/>
+                            <a:cs typeface="Calibri" panose="020F0502020204030204" pitchFamily="34" charset="0"/>
+                          </a:rPr>
+                          <m:t>𝜆</m:t>
+                        </m:r>
+                      </m:e>
+                      <m:sub>
+                        <m:r>
+                          <a:rPr lang="es-ES" i="1">
+                            <a:solidFill>
+                              <a:srgbClr val="92D050"/>
+                            </a:solidFill>
+                            <a:latin typeface="Cambria Math" panose="02040503050406030204" pitchFamily="18" charset="0"/>
+                            <a:cs typeface="Calibri" panose="020F0502020204030204" pitchFamily="34" charset="0"/>
+                          </a:rPr>
+                          <m:t>1</m:t>
+                        </m:r>
+                      </m:sub>
+                      <m:sup>
+                        <m:r>
+                          <a:rPr lang="es-ES" b="0" i="1" smtClean="0">
+                            <a:solidFill>
+                              <a:srgbClr val="92D050"/>
+                            </a:solidFill>
+                            <a:latin typeface="Cambria Math" panose="02040503050406030204" pitchFamily="18" charset="0"/>
+                            <a:cs typeface="Calibri" panose="020F0502020204030204" pitchFamily="34" charset="0"/>
+                          </a:rPr>
+                          <m:t>𝑅</m:t>
+                        </m:r>
+                      </m:sup>
+                    </m:sSubSup>
+                    <m:r>
+                      <a:rPr lang="es-ES" i="1">
+                        <a:solidFill>
+                          <a:srgbClr val="92D050"/>
+                        </a:solidFill>
+                        <a:latin typeface="Cambria Math" panose="02040503050406030204" pitchFamily="18" charset="0"/>
+                        <a:cs typeface="Calibri" panose="020F0502020204030204" pitchFamily="34" charset="0"/>
+                      </a:rPr>
+                      <m:t>,…,</m:t>
+                    </m:r>
+                    <m:sSubSup>
+                      <m:sSubSupPr>
+                        <m:ctrlPr>
+                          <a:rPr lang="es-ES" i="1">
+                            <a:solidFill>
+                              <a:srgbClr val="92D050"/>
+                            </a:solidFill>
+                            <a:latin typeface="Cambria Math" panose="02040503050406030204" pitchFamily="18" charset="0"/>
+                            <a:cs typeface="Calibri" panose="020F0502020204030204" pitchFamily="34" charset="0"/>
+                          </a:rPr>
+                        </m:ctrlPr>
+                      </m:sSubSupPr>
+                      <m:e>
+                        <m:r>
+                          <a:rPr lang="es-ES" i="1">
+                            <a:solidFill>
+                              <a:srgbClr val="92D050"/>
+                            </a:solidFill>
+                            <a:latin typeface="Cambria Math" panose="02040503050406030204" pitchFamily="18" charset="0"/>
+                            <a:cs typeface="Calibri" panose="020F0502020204030204" pitchFamily="34" charset="0"/>
+                          </a:rPr>
+                          <m:t>𝜆</m:t>
+                        </m:r>
+                      </m:e>
+                      <m:sub>
+                        <m:r>
+                          <a:rPr lang="es-ES" i="1">
+                            <a:solidFill>
+                              <a:srgbClr val="92D050"/>
+                            </a:solidFill>
+                            <a:latin typeface="Cambria Math" panose="02040503050406030204" pitchFamily="18" charset="0"/>
+                            <a:cs typeface="Calibri" panose="020F0502020204030204" pitchFamily="34" charset="0"/>
+                          </a:rPr>
+                          <m:t>𝑟</m:t>
+                        </m:r>
+                      </m:sub>
+                      <m:sup>
+                        <m:r>
+                          <a:rPr lang="es-ES" b="0" i="1" smtClean="0">
+                            <a:solidFill>
+                              <a:srgbClr val="92D050"/>
+                            </a:solidFill>
+                            <a:latin typeface="Cambria Math" panose="02040503050406030204" pitchFamily="18" charset="0"/>
+                            <a:cs typeface="Calibri" panose="020F0502020204030204" pitchFamily="34" charset="0"/>
+                          </a:rPr>
+                          <m:t>𝑅</m:t>
+                        </m:r>
+                      </m:sup>
+                    </m:sSubSup>
+                  </m:oMath>
+                </a14:m>
+                <a:r>
+                  <a:rPr lang="es-ES" sz="2000" b="0" dirty="0">
+                    <a:solidFill>
+                      <a:schemeClr val="bg1"/>
+                    </a:solidFill>
+                    <a:latin typeface="Calibri" panose="020F0502020204030204" pitchFamily="34" charset="0"/>
+                    <a:cs typeface="Calibri" panose="020F0502020204030204" pitchFamily="34" charset="0"/>
+                  </a:rPr>
+                  <a:t>. </a:t>
+                </a:r>
+              </a:p>
+              <a:p>
+                <a:pPr marL="0" indent="0">
+                  <a:buNone/>
+                </a:pPr>
+                <a:endParaRPr lang="es-ES" sz="2000" dirty="0">
+                  <a:solidFill>
+                    <a:schemeClr val="bg1"/>
+                  </a:solidFill>
+                  <a:latin typeface="Calibri" panose="020F0502020204030204" pitchFamily="34" charset="0"/>
+                  <a:cs typeface="Calibri" panose="020F0502020204030204" pitchFamily="34" charset="0"/>
+                </a:endParaRPr>
+              </a:p>
+              <a:p>
+                <a:pPr marL="0" indent="0">
+                  <a:buNone/>
+                </a:pPr>
+                <a:r>
+                  <a:rPr lang="es-ES" sz="2000" b="0" dirty="0">
+                    <a:solidFill>
+                      <a:schemeClr val="bg1"/>
+                    </a:solidFill>
+                    <a:latin typeface="Calibri" panose="020F0502020204030204" pitchFamily="34" charset="0"/>
+                    <a:cs typeface="Calibri" panose="020F0502020204030204" pitchFamily="34" charset="0"/>
+                  </a:rPr>
+                  <a:t>Notemos que </a:t>
+                </a:r>
+                <a14:m>
+                  <m:oMath xmlns:m="http://schemas.openxmlformats.org/officeDocument/2006/math">
+                    <m:r>
+                      <a:rPr lang="es-ES" sz="2000" b="1" i="0" smtClean="0">
+                        <a:solidFill>
+                          <a:schemeClr val="bg1"/>
+                        </a:solidFill>
+                        <a:latin typeface="Cambria Math" panose="02040503050406030204" pitchFamily="18" charset="0"/>
+                        <a:cs typeface="Calibri" panose="020F0502020204030204" pitchFamily="34" charset="0"/>
+                      </a:rPr>
+                      <m:t>𝐲</m:t>
+                    </m:r>
+                    <m:r>
+                      <a:rPr lang="es-ES" sz="2000" b="0" i="0" smtClean="0">
+                        <a:solidFill>
+                          <a:schemeClr val="bg1"/>
+                        </a:solidFill>
+                        <a:latin typeface="Cambria Math" panose="02040503050406030204" pitchFamily="18" charset="0"/>
+                        <a:cs typeface="Calibri" panose="020F0502020204030204" pitchFamily="34" charset="0"/>
+                      </a:rPr>
+                      <m:t>=</m:t>
+                    </m:r>
+                    <m:acc>
+                      <m:accPr>
+                        <m:chr m:val="̃"/>
+                        <m:ctrlPr>
+                          <a:rPr lang="es-ES" sz="2000" i="1">
+                            <a:solidFill>
+                              <a:schemeClr val="bg1"/>
+                            </a:solidFill>
+                            <a:latin typeface="Cambria Math" panose="02040503050406030204" pitchFamily="18" charset="0"/>
+                            <a:cs typeface="Calibri" panose="020F0502020204030204" pitchFamily="34" charset="0"/>
+                          </a:rPr>
+                        </m:ctrlPr>
+                      </m:accPr>
+                      <m:e>
+                        <m:r>
+                          <a:rPr lang="es-ES" sz="2000" b="1">
+                            <a:solidFill>
+                              <a:schemeClr val="bg1"/>
+                            </a:solidFill>
+                            <a:latin typeface="Cambria Math" panose="02040503050406030204" pitchFamily="18" charset="0"/>
+                            <a:cs typeface="Calibri" panose="020F0502020204030204" pitchFamily="34" charset="0"/>
+                          </a:rPr>
+                          <m:t>𝐱</m:t>
+                        </m:r>
+                      </m:e>
+                    </m:acc>
+                    <m:r>
+                      <a:rPr lang="es-ES" sz="2000" i="1">
+                        <a:solidFill>
+                          <a:schemeClr val="bg1"/>
+                        </a:solidFill>
+                        <a:latin typeface="Cambria Math" panose="02040503050406030204" pitchFamily="18" charset="0"/>
+                        <a:cs typeface="Calibri" panose="020F0502020204030204" pitchFamily="34" charset="0"/>
+                      </a:rPr>
+                      <m:t> </m:t>
+                    </m:r>
+                    <m:sSubSup>
+                      <m:sSubSupPr>
+                        <m:ctrlPr>
+                          <a:rPr lang="es-ES" sz="2000" i="1">
+                            <a:solidFill>
+                              <a:schemeClr val="bg1"/>
+                            </a:solidFill>
+                            <a:latin typeface="Cambria Math" panose="02040503050406030204" pitchFamily="18" charset="0"/>
+                            <a:cs typeface="Calibri" panose="020F0502020204030204" pitchFamily="34" charset="0"/>
+                          </a:rPr>
+                        </m:ctrlPr>
+                      </m:sSubSupPr>
+                      <m:e>
+                        <m:r>
+                          <a:rPr lang="es-ES" sz="2000" i="1">
+                            <a:solidFill>
+                              <a:schemeClr val="bg1"/>
+                            </a:solidFill>
+                            <a:latin typeface="Cambria Math" panose="02040503050406030204" pitchFamily="18" charset="0"/>
+                            <a:cs typeface="Calibri" panose="020F0502020204030204" pitchFamily="34" charset="0"/>
+                          </a:rPr>
+                          <m:t>𝐷</m:t>
+                        </m:r>
+                      </m:e>
+                      <m:sub>
+                        <m:sSub>
+                          <m:sSubPr>
+                            <m:ctrlPr>
+                              <a:rPr lang="es-ES" sz="2000" i="1">
+                                <a:solidFill>
+                                  <a:schemeClr val="bg1"/>
+                                </a:solidFill>
+                                <a:latin typeface="Cambria Math" panose="02040503050406030204" pitchFamily="18" charset="0"/>
+                                <a:cs typeface="Calibri" panose="020F0502020204030204" pitchFamily="34" charset="0"/>
+                              </a:rPr>
+                            </m:ctrlPr>
+                          </m:sSubPr>
+                          <m:e>
+                            <m:r>
+                              <a:rPr lang="es-ES" sz="2000" i="1">
+                                <a:solidFill>
+                                  <a:schemeClr val="bg1"/>
+                                </a:solidFill>
+                                <a:latin typeface="Cambria Math" panose="02040503050406030204" pitchFamily="18" charset="0"/>
+                                <a:cs typeface="Calibri" panose="020F0502020204030204" pitchFamily="34" charset="0"/>
+                              </a:rPr>
+                              <m:t>𝑆</m:t>
+                            </m:r>
+                          </m:e>
+                          <m:sub>
+                            <m:r>
+                              <a:rPr lang="es-ES" sz="2000" i="1">
+                                <a:solidFill>
+                                  <a:schemeClr val="bg1"/>
+                                </a:solidFill>
+                                <a:latin typeface="Cambria Math" panose="02040503050406030204" pitchFamily="18" charset="0"/>
+                                <a:cs typeface="Calibri" panose="020F0502020204030204" pitchFamily="34" charset="0"/>
+                              </a:rPr>
+                              <m:t>𝑥</m:t>
+                            </m:r>
+                          </m:sub>
+                        </m:sSub>
+                      </m:sub>
+                      <m:sup>
+                        <m:r>
+                          <a:rPr lang="es-ES" sz="2000" i="1">
+                            <a:solidFill>
+                              <a:schemeClr val="bg1"/>
+                            </a:solidFill>
+                            <a:latin typeface="Cambria Math" panose="02040503050406030204" pitchFamily="18" charset="0"/>
+                            <a:cs typeface="Calibri" panose="020F0502020204030204" pitchFamily="34" charset="0"/>
+                          </a:rPr>
+                          <m:t>−1/2</m:t>
+                        </m:r>
+                      </m:sup>
+                    </m:sSubSup>
+                  </m:oMath>
+                </a14:m>
+                <a:r>
+                  <a:rPr lang="es-ES" sz="2000" b="0" dirty="0">
+                    <a:solidFill>
+                      <a:schemeClr val="bg1"/>
+                    </a:solidFill>
+                    <a:latin typeface="Calibri" panose="020F0502020204030204" pitchFamily="34" charset="0"/>
+                    <a:cs typeface="Calibri" panose="020F0502020204030204" pitchFamily="34" charset="0"/>
+                  </a:rPr>
+                  <a:t> son los datos originales normados, donde </a:t>
                 </a:r>
                 <a14:m>
                   <m:oMath xmlns:m="http://schemas.openxmlformats.org/officeDocument/2006/math">
@@ -10868,7 +11596,7 @@
             </p:txBody>
           </p:sp>
         </mc:Choice>
-        <mc:Fallback xmlns="">
+        <mc:Fallback>
           <p:sp>
             <p:nvSpPr>
               <p:cNvPr id="3" name="Marcador de contenido 2">
@@ -10888,12 +11616,12 @@
             <p:spPr>
               <a:xfrm>
                 <a:off x="677334" y="1556189"/>
-                <a:ext cx="9188562" cy="4932584"/>
+                <a:ext cx="9025959" cy="4932584"/>
               </a:xfrm>
               <a:blipFill>
                 <a:blip r:embed="rId2"/>
                 <a:stretch>
-                  <a:fillRect l="-664" t="-618"/>
+                  <a:fillRect l="-675" t="-618" r="-270"/>
                 </a:stretch>
               </a:blipFill>
             </p:spPr>
@@ -11298,7 +12026,12 @@
             <p:ph type="title"/>
           </p:nvPr>
         </p:nvSpPr>
-        <p:spPr/>
+        <p:spPr>
+          <a:xfrm>
+            <a:off x="464271" y="574090"/>
+            <a:ext cx="8596668" cy="1320800"/>
+          </a:xfrm>
+        </p:spPr>
         <p:txBody>
           <a:bodyPr/>
           <a:lstStyle/>
@@ -11313,8 +12046,8 @@
           </a:p>
         </p:txBody>
       </p:sp>
-      <mc:AlternateContent xmlns:mc="http://schemas.openxmlformats.org/markup-compatibility/2006" xmlns:a14="http://schemas.microsoft.com/office/drawing/2010/main">
-        <mc:Choice Requires="a14">
+      <mc:AlternateContent xmlns:mc="http://schemas.openxmlformats.org/markup-compatibility/2006">
+        <mc:Choice xmlns:a14="http://schemas.microsoft.com/office/drawing/2010/main" Requires="a14">
           <p:sp>
             <p:nvSpPr>
               <p:cNvPr id="3" name="Marcador de contenido 2">
@@ -11333,8 +12066,8 @@
             </p:nvSpPr>
             <p:spPr>
               <a:xfrm>
-                <a:off x="677334" y="1556189"/>
-                <a:ext cx="9156477" cy="4932584"/>
+                <a:off x="464271" y="1458533"/>
+                <a:ext cx="7880740" cy="4932584"/>
               </a:xfrm>
             </p:spPr>
             <p:txBody>
@@ -11679,7 +12412,7 @@
             </p:txBody>
           </p:sp>
         </mc:Choice>
-        <mc:Fallback xmlns="">
+        <mc:Fallback>
           <p:sp>
             <p:nvSpPr>
               <p:cNvPr id="3" name="Marcador de contenido 2">
@@ -11698,13 +12431,13 @@
             </p:nvSpPr>
             <p:spPr>
               <a:xfrm>
-                <a:off x="677334" y="1556189"/>
-                <a:ext cx="9156477" cy="4932584"/>
+                <a:off x="464271" y="1458533"/>
+                <a:ext cx="7880740" cy="4932584"/>
               </a:xfrm>
               <a:blipFill>
                 <a:blip r:embed="rId2"/>
                 <a:stretch>
-                  <a:fillRect l="-666" t="-618" r="-799"/>
+                  <a:fillRect l="-773" t="-618" r="-773" b="-1978"/>
                 </a:stretch>
               </a:blipFill>
             </p:spPr>
@@ -11723,6 +12456,49 @@
           </p:sp>
         </mc:Fallback>
       </mc:AlternateContent>
+      <p:pic>
+        <p:nvPicPr>
+          <p:cNvPr id="4" name="Imagen 3">
+            <a:extLst>
+              <a:ext uri="{FF2B5EF4-FFF2-40B4-BE49-F238E27FC236}">
+                <a16:creationId xmlns:a16="http://schemas.microsoft.com/office/drawing/2014/main" id="{F1E12568-3223-4551-A38D-68027CD2484E}"/>
+              </a:ext>
+            </a:extLst>
+          </p:cNvPr>
+          <p:cNvPicPr>
+            <a:picLocks noChangeAspect="1"/>
+          </p:cNvPicPr>
+          <p:nvPr/>
+        </p:nvPicPr>
+        <p:blipFill>
+          <a:blip r:embed="rId3"/>
+          <a:stretch>
+            <a:fillRect/>
+          </a:stretch>
+        </p:blipFill>
+        <p:spPr>
+          <a:xfrm>
+            <a:off x="8264753" y="149768"/>
+            <a:ext cx="3751302" cy="2617531"/>
+          </a:xfrm>
+          <a:prstGeom prst="roundRect">
+            <a:avLst>
+              <a:gd name="adj" fmla="val 8594"/>
+            </a:avLst>
+          </a:prstGeom>
+          <a:solidFill>
+            <a:srgbClr val="FFFFFF">
+              <a:shade val="85000"/>
+            </a:srgbClr>
+          </a:solidFill>
+          <a:ln>
+            <a:noFill/>
+          </a:ln>
+          <a:effectLst>
+            <a:reflection blurRad="12700" stA="38000" endPos="28000" dist="5000" dir="5400000" sy="-100000" algn="bl" rotWithShape="0"/>
+          </a:effectLst>
+        </p:spPr>
+      </p:pic>
     </p:spTree>
     <p:extLst>
       <p:ext uri="{BB962C8B-B14F-4D97-AF65-F5344CB8AC3E}">
@@ -11777,7 +12553,12 @@
             <p:ph type="title"/>
           </p:nvPr>
         </p:nvSpPr>
-        <p:spPr/>
+        <p:spPr>
+          <a:xfrm>
+            <a:off x="446515" y="582967"/>
+            <a:ext cx="8596668" cy="1320800"/>
+          </a:xfrm>
+        </p:spPr>
         <p:txBody>
           <a:bodyPr/>
           <a:lstStyle/>
@@ -11792,8 +12573,8 @@
           </a:p>
         </p:txBody>
       </p:sp>
-      <mc:AlternateContent xmlns:mc="http://schemas.openxmlformats.org/markup-compatibility/2006" xmlns:a14="http://schemas.microsoft.com/office/drawing/2010/main">
-        <mc:Choice Requires="a14">
+      <mc:AlternateContent xmlns:mc="http://schemas.openxmlformats.org/markup-compatibility/2006">
+        <mc:Choice xmlns:a14="http://schemas.microsoft.com/office/drawing/2010/main" Requires="a14">
           <p:sp>
             <p:nvSpPr>
               <p:cNvPr id="3" name="Marcador de contenido 2">
@@ -11812,7 +12593,7 @@
             </p:nvSpPr>
             <p:spPr>
               <a:xfrm>
-                <a:off x="677334" y="1556189"/>
+                <a:off x="446515" y="1556189"/>
                 <a:ext cx="9156477" cy="4932584"/>
               </a:xfrm>
             </p:spPr>
@@ -12028,7 +12809,7 @@
             </p:txBody>
           </p:sp>
         </mc:Choice>
-        <mc:Fallback xmlns="">
+        <mc:Fallback>
           <p:sp>
             <p:nvSpPr>
               <p:cNvPr id="3" name="Marcador de contenido 2">
@@ -12047,7 +12828,7 @@
             </p:nvSpPr>
             <p:spPr>
               <a:xfrm>
-                <a:off x="677334" y="1556189"/>
+                <a:off x="446515" y="1556189"/>
                 <a:ext cx="9156477" cy="4932584"/>
               </a:xfrm>
               <a:blipFill>

</xml_diff>